<commit_message>
Load only TimeSeries module in Redis
</commit_message>
<xml_diff>
--- a/images/data_flow.pptx
+++ b/images/data_flow.pptx
@@ -261,7 +261,7 @@
           <a:p>
             <a:fld id="{41C7709F-3979-40BD-9134-70593DAB5F64}" type="datetimeFigureOut">
               <a:rPr lang="en-SE" smtClean="0"/>
-              <a:t>2021-04-17</a:t>
+              <a:t>2021-04-18</a:t>
             </a:fld>
             <a:endParaRPr lang="en-SE"/>
           </a:p>
@@ -461,7 +461,7 @@
           <a:p>
             <a:fld id="{41C7709F-3979-40BD-9134-70593DAB5F64}" type="datetimeFigureOut">
               <a:rPr lang="en-SE" smtClean="0"/>
-              <a:t>2021-04-17</a:t>
+              <a:t>2021-04-18</a:t>
             </a:fld>
             <a:endParaRPr lang="en-SE"/>
           </a:p>
@@ -671,7 +671,7 @@
           <a:p>
             <a:fld id="{41C7709F-3979-40BD-9134-70593DAB5F64}" type="datetimeFigureOut">
               <a:rPr lang="en-SE" smtClean="0"/>
-              <a:t>2021-04-17</a:t>
+              <a:t>2021-04-18</a:t>
             </a:fld>
             <a:endParaRPr lang="en-SE"/>
           </a:p>
@@ -871,7 +871,7 @@
           <a:p>
             <a:fld id="{41C7709F-3979-40BD-9134-70593DAB5F64}" type="datetimeFigureOut">
               <a:rPr lang="en-SE" smtClean="0"/>
-              <a:t>2021-04-17</a:t>
+              <a:t>2021-04-18</a:t>
             </a:fld>
             <a:endParaRPr lang="en-SE"/>
           </a:p>
@@ -1147,7 +1147,7 @@
           <a:p>
             <a:fld id="{41C7709F-3979-40BD-9134-70593DAB5F64}" type="datetimeFigureOut">
               <a:rPr lang="en-SE" smtClean="0"/>
-              <a:t>2021-04-17</a:t>
+              <a:t>2021-04-18</a:t>
             </a:fld>
             <a:endParaRPr lang="en-SE"/>
           </a:p>
@@ -1415,7 +1415,7 @@
           <a:p>
             <a:fld id="{41C7709F-3979-40BD-9134-70593DAB5F64}" type="datetimeFigureOut">
               <a:rPr lang="en-SE" smtClean="0"/>
-              <a:t>2021-04-17</a:t>
+              <a:t>2021-04-18</a:t>
             </a:fld>
             <a:endParaRPr lang="en-SE"/>
           </a:p>
@@ -1830,7 +1830,7 @@
           <a:p>
             <a:fld id="{41C7709F-3979-40BD-9134-70593DAB5F64}" type="datetimeFigureOut">
               <a:rPr lang="en-SE" smtClean="0"/>
-              <a:t>2021-04-17</a:t>
+              <a:t>2021-04-18</a:t>
             </a:fld>
             <a:endParaRPr lang="en-SE"/>
           </a:p>
@@ -1972,7 +1972,7 @@
           <a:p>
             <a:fld id="{41C7709F-3979-40BD-9134-70593DAB5F64}" type="datetimeFigureOut">
               <a:rPr lang="en-SE" smtClean="0"/>
-              <a:t>2021-04-17</a:t>
+              <a:t>2021-04-18</a:t>
             </a:fld>
             <a:endParaRPr lang="en-SE"/>
           </a:p>
@@ -2085,7 +2085,7 @@
           <a:p>
             <a:fld id="{41C7709F-3979-40BD-9134-70593DAB5F64}" type="datetimeFigureOut">
               <a:rPr lang="en-SE" smtClean="0"/>
-              <a:t>2021-04-17</a:t>
+              <a:t>2021-04-18</a:t>
             </a:fld>
             <a:endParaRPr lang="en-SE"/>
           </a:p>
@@ -2398,7 +2398,7 @@
           <a:p>
             <a:fld id="{41C7709F-3979-40BD-9134-70593DAB5F64}" type="datetimeFigureOut">
               <a:rPr lang="en-SE" smtClean="0"/>
-              <a:t>2021-04-17</a:t>
+              <a:t>2021-04-18</a:t>
             </a:fld>
             <a:endParaRPr lang="en-SE"/>
           </a:p>
@@ -2687,7 +2687,7 @@
           <a:p>
             <a:fld id="{41C7709F-3979-40BD-9134-70593DAB5F64}" type="datetimeFigureOut">
               <a:rPr lang="en-SE" smtClean="0"/>
-              <a:t>2021-04-17</a:t>
+              <a:t>2021-04-18</a:t>
             </a:fld>
             <a:endParaRPr lang="en-SE"/>
           </a:p>
@@ -2930,7 +2930,7 @@
           <a:p>
             <a:fld id="{41C7709F-3979-40BD-9134-70593DAB5F64}" type="datetimeFigureOut">
               <a:rPr lang="en-SE" smtClean="0"/>
-              <a:t>2021-04-17</a:t>
+              <a:t>2021-04-18</a:t>
             </a:fld>
             <a:endParaRPr lang="en-SE"/>
           </a:p>
@@ -3376,7 +3376,7 @@
         </p:blipFill>
         <p:spPr bwMode="auto">
           <a:xfrm>
-            <a:off x="1214789" y="1937729"/>
+            <a:off x="820819" y="1937729"/>
             <a:ext cx="1440000" cy="1440000"/>
           </a:xfrm>
           <a:prstGeom prst="rect">
@@ -3475,7 +3475,7 @@
         </p:blipFill>
         <p:spPr>
           <a:xfrm>
-            <a:off x="8580965" y="1937729"/>
+            <a:off x="8974935" y="1937729"/>
             <a:ext cx="1440000" cy="1440000"/>
           </a:xfrm>
           <a:prstGeom prst="rect">
@@ -3540,8 +3540,8 @@
         </p:nvCxnSpPr>
         <p:spPr>
           <a:xfrm>
-            <a:off x="2654789" y="2657729"/>
-            <a:ext cx="2243088" cy="0"/>
+            <a:off x="2260819" y="2657729"/>
+            <a:ext cx="2637058" cy="0"/>
           </a:xfrm>
           <a:prstGeom prst="straightConnector1">
             <a:avLst/>
@@ -3584,7 +3584,7 @@
         <p:spPr>
           <a:xfrm>
             <a:off x="6337877" y="2657729"/>
-            <a:ext cx="2243088" cy="0"/>
+            <a:ext cx="2637058" cy="0"/>
           </a:xfrm>
           <a:prstGeom prst="straightConnector1">
             <a:avLst/>
@@ -3665,8 +3665,8 @@
         </p:nvSpPr>
         <p:spPr>
           <a:xfrm>
-            <a:off x="2786544" y="1211179"/>
-            <a:ext cx="1979577" cy="1446550"/>
+            <a:off x="2465963" y="1211179"/>
+            <a:ext cx="2310318" cy="1446550"/>
           </a:xfrm>
           <a:prstGeom prst="rect">
             <a:avLst/>
@@ -3735,7 +3735,7 @@
           <a:p>
             <a:r>
               <a:rPr lang="en-US" sz="800" dirty="0"/>
-              <a:t>  “timeCreated”: “UTC iso format”</a:t>
+              <a:t>  “timeCreated”: “2021-04-18T13:21:41.1161051Z”</a:t>
             </a:r>
           </a:p>
           <a:p>
@@ -3844,7 +3844,7 @@
         </p:blipFill>
         <p:spPr bwMode="auto">
           <a:xfrm>
-            <a:off x="8580965" y="4782292"/>
+            <a:off x="8974935" y="4782292"/>
             <a:ext cx="1440000" cy="1440000"/>
           </a:xfrm>
           <a:prstGeom prst="rect">
@@ -3881,7 +3881,7 @@
         <p:spPr>
           <a:xfrm>
             <a:off x="6362704" y="5502292"/>
-            <a:ext cx="2218261" cy="0"/>
+            <a:ext cx="2612231" cy="0"/>
           </a:xfrm>
           <a:prstGeom prst="straightConnector1">
             <a:avLst/>
@@ -3923,8 +3923,8 @@
         </p:nvCxnSpPr>
         <p:spPr>
           <a:xfrm rot="16200000" flipV="1">
-            <a:off x="7459421" y="96185"/>
-            <a:ext cx="12700" cy="3683088"/>
+            <a:off x="7656406" y="-100800"/>
+            <a:ext cx="12700" cy="4077058"/>
           </a:xfrm>
           <a:prstGeom prst="bentConnector3">
             <a:avLst>

</xml_diff>